<commit_message>
Remove PrePPT.py and update presentation file
Deleted the PrePPT.py script used to generate the presentation and updated the Star_Collector_Presentation_Perfect_16pages.pptx file. This streamlines the repository by removing the generation script and providing the latest version of the presentation.
</commit_message>
<xml_diff>
--- a/Star_Collector_Presentation_Perfect_16pages.pptx
+++ b/Star_Collector_Presentation_Perfect_16pages.pptx
@@ -3211,7 +3211,12 @@
             <p:ph idx="1"/>
           </p:nvPr>
         </p:nvSpPr>
-        <p:spPr/>
+        <p:spPr>
+          <a:xfrm>
+            <a:off x="1718310" y="1600200"/>
+            <a:ext cx="8229600" cy="4525963"/>
+          </a:xfrm>
+        </p:spPr>
         <p:txBody>
           <a:bodyPr/>
           <a:lstStyle/>
@@ -3281,23 +3286,45 @@
             </a:pPr>
           </a:p>
           <a:p>
-            <a:pPr>
-              <a:spcAft>
-                <a:spcPts val="600"/>
-              </a:spcAft>
-              <a:defRPr sz="2200">
-                <a:solidFill>
-                  <a:srgbClr val="FFFFFF"/>
-                </a:solidFill>
-                <a:latin typeface="Calibri" panose="020F0502020204030204"/>
-              </a:defRPr>
-            </a:pPr>
-            <a:r>
-              <a:t>Insert falling timeline</a:t>
-            </a:r>
-          </a:p>
-        </p:txBody>
-      </p:sp>
+            <a:pPr marL="0" indent="0">
+              <a:spcAft>
+                <a:spcPts val="600"/>
+              </a:spcAft>
+              <a:buNone/>
+              <a:defRPr sz="2200">
+                <a:solidFill>
+                  <a:srgbClr val="FFFFFF"/>
+                </a:solidFill>
+                <a:latin typeface="Calibri" panose="020F0502020204030204"/>
+              </a:defRPr>
+            </a:pPr>
+          </a:p>
+        </p:txBody>
+      </p:sp>
+      <p:pic>
+        <p:nvPicPr>
+          <p:cNvPr id="4" name="图片 3"/>
+          <p:cNvPicPr>
+            <a:picLocks noChangeAspect="1"/>
+          </p:cNvPicPr>
+          <p:nvPr/>
+        </p:nvPicPr>
+        <p:blipFill>
+          <a:blip r:embed="rId1"/>
+          <a:stretch>
+            <a:fillRect/>
+          </a:stretch>
+        </p:blipFill>
+        <p:spPr>
+          <a:xfrm>
+            <a:off x="1718310" y="3962400"/>
+            <a:ext cx="7119620" cy="2515870"/>
+          </a:xfrm>
+          <a:prstGeom prst="rect">
+            <a:avLst/>
+          </a:prstGeom>
+        </p:spPr>
+      </p:pic>
     </p:spTree>
   </p:cSld>
   <p:clrMapOvr>
@@ -3363,13 +3390,22 @@
             <p:ph idx="1"/>
           </p:nvPr>
         </p:nvSpPr>
-        <p:spPr/>
-        <p:txBody>
-          <a:bodyPr/>
-          <a:lstStyle/>
-          <a:p/>
+        <p:spPr>
+          <a:xfrm>
+            <a:off x="1582420" y="1256030"/>
+            <a:ext cx="8229600" cy="4525963"/>
+          </a:xfrm>
+        </p:spPr>
+        <p:txBody>
+          <a:bodyPr/>
+          <a:lstStyle/>
           <a:p>
             <a:pPr marL="0" indent="0">
+              <a:buNone/>
+            </a:pPr>
+          </a:p>
+          <a:p>
+            <a:pPr marL="0" indent="0">
               <a:spcAft>
                 <a:spcPts val="600"/>
               </a:spcAft>
@@ -3449,24 +3485,32 @@
               </a:defRPr>
             </a:pPr>
           </a:p>
-          <a:p>
-            <a:pPr>
-              <a:spcAft>
-                <a:spcPts val="600"/>
-              </a:spcAft>
-              <a:defRPr sz="2200">
-                <a:solidFill>
-                  <a:srgbClr val="FFFFFF"/>
-                </a:solidFill>
-                <a:latin typeface="Calibri" panose="020F0502020204030204"/>
-              </a:defRPr>
-            </a:pPr>
-            <a:r>
-              <a:t>Insert particle fountain</a:t>
-            </a:r>
-          </a:p>
-        </p:txBody>
-      </p:sp>
+        </p:txBody>
+      </p:sp>
+      <p:pic>
+        <p:nvPicPr>
+          <p:cNvPr id="4" name="图片 3"/>
+          <p:cNvPicPr>
+            <a:picLocks noChangeAspect="1"/>
+          </p:cNvPicPr>
+          <p:nvPr/>
+        </p:nvPicPr>
+        <p:blipFill>
+          <a:blip r:embed="rId1"/>
+          <a:stretch>
+            <a:fillRect/>
+          </a:stretch>
+        </p:blipFill>
+        <p:spPr>
+          <a:xfrm>
+            <a:off x="1582420" y="3790950"/>
+            <a:ext cx="6440170" cy="2555240"/>
+          </a:xfrm>
+          <a:prstGeom prst="rect">
+            <a:avLst/>
+          </a:prstGeom>
+        </p:spPr>
+      </p:pic>
     </p:spTree>
   </p:cSld>
   <p:clrMapOvr>
@@ -3532,7 +3576,12 @@
             <p:ph idx="1"/>
           </p:nvPr>
         </p:nvSpPr>
-        <p:spPr/>
+        <p:spPr>
+          <a:xfrm>
+            <a:off x="983615" y="1600200"/>
+            <a:ext cx="8229600" cy="4525963"/>
+          </a:xfrm>
+        </p:spPr>
         <p:txBody>
           <a:bodyPr/>
           <a:lstStyle/>
@@ -3618,24 +3667,32 @@
               </a:defRPr>
             </a:pPr>
           </a:p>
-          <a:p>
-            <a:pPr>
-              <a:spcAft>
-                <a:spcPts val="600"/>
-              </a:spcAft>
-              <a:defRPr sz="2200">
-                <a:solidFill>
-                  <a:srgbClr val="FFFFFF"/>
-                </a:solidFill>
-                <a:latin typeface="Calibri" panose="020F0502020204030204"/>
-              </a:defRPr>
-            </a:pPr>
-            <a:r>
-              <a:t>Insert code + diagram</a:t>
-            </a:r>
-          </a:p>
-        </p:txBody>
-      </p:sp>
+        </p:txBody>
+      </p:sp>
+      <p:pic>
+        <p:nvPicPr>
+          <p:cNvPr id="4" name="图片 3"/>
+          <p:cNvPicPr>
+            <a:picLocks noChangeAspect="1"/>
+          </p:cNvPicPr>
+          <p:nvPr/>
+        </p:nvPicPr>
+        <p:blipFill>
+          <a:blip r:embed="rId1"/>
+          <a:stretch>
+            <a:fillRect/>
+          </a:stretch>
+        </p:blipFill>
+        <p:spPr>
+          <a:xfrm>
+            <a:off x="5702935" y="2414905"/>
+            <a:ext cx="5862320" cy="2689860"/>
+          </a:xfrm>
+          <a:prstGeom prst="rect">
+            <a:avLst/>
+          </a:prstGeom>
+        </p:spPr>
+      </p:pic>
     </p:spTree>
   </p:cSld>
   <p:clrMapOvr>
@@ -3701,7 +3758,12 @@
             <p:ph idx="1"/>
           </p:nvPr>
         </p:nvSpPr>
-        <p:spPr/>
+        <p:spPr>
+          <a:xfrm>
+            <a:off x="1391285" y="1600200"/>
+            <a:ext cx="8229600" cy="4525963"/>
+          </a:xfrm>
+        </p:spPr>
         <p:txBody>
           <a:bodyPr/>
           <a:lstStyle/>
@@ -3771,23 +3833,45 @@
             </a:pPr>
           </a:p>
           <a:p>
-            <a:pPr>
-              <a:spcAft>
-                <a:spcPts val="600"/>
-              </a:spcAft>
-              <a:defRPr sz="2200">
-                <a:solidFill>
-                  <a:srgbClr val="FFFFFF"/>
-                </a:solidFill>
-                <a:latin typeface="Calibri" panose="020F0502020204030204"/>
-              </a:defRPr>
-            </a:pPr>
-            <a:r>
-              <a:t>Insert heightmap</a:t>
-            </a:r>
-          </a:p>
-        </p:txBody>
-      </p:sp>
+            <a:pPr marL="0" indent="0">
+              <a:spcAft>
+                <a:spcPts val="600"/>
+              </a:spcAft>
+              <a:buNone/>
+              <a:defRPr sz="2200">
+                <a:solidFill>
+                  <a:srgbClr val="FFFFFF"/>
+                </a:solidFill>
+                <a:latin typeface="Calibri" panose="020F0502020204030204"/>
+              </a:defRPr>
+            </a:pPr>
+          </a:p>
+        </p:txBody>
+      </p:sp>
+      <p:pic>
+        <p:nvPicPr>
+          <p:cNvPr id="4" name="图片 3"/>
+          <p:cNvPicPr>
+            <a:picLocks noChangeAspect="1"/>
+          </p:cNvPicPr>
+          <p:nvPr/>
+        </p:nvPicPr>
+        <p:blipFill>
+          <a:blip r:embed="rId1"/>
+          <a:stretch>
+            <a:fillRect/>
+          </a:stretch>
+        </p:blipFill>
+        <p:spPr>
+          <a:xfrm>
+            <a:off x="1391285" y="3798570"/>
+            <a:ext cx="5804535" cy="2327910"/>
+          </a:xfrm>
+          <a:prstGeom prst="rect">
+            <a:avLst/>
+          </a:prstGeom>
+        </p:spPr>
+      </p:pic>
     </p:spTree>
   </p:cSld>
   <p:clrMapOvr>
@@ -3853,10 +3937,15 @@
             <p:ph idx="1"/>
           </p:nvPr>
         </p:nvSpPr>
-        <p:spPr/>
+        <p:spPr>
+          <a:xfrm>
+            <a:off x="1645285" y="1600200"/>
+            <a:ext cx="8229600" cy="4525963"/>
+          </a:xfrm>
+        </p:spPr>
         <p:txBody>
           <a:bodyPr>
-            <a:normAutofit lnSpcReduction="10000"/>
+            <a:normAutofit lnSpcReduction="20000"/>
           </a:bodyPr>
           <a:lstStyle/>
           <a:p/>
@@ -3873,8 +3962,10 @@
               </a:defRPr>
             </a:pPr>
             <a:r>
+              <a:rPr b="1"/>
               <a:t>Achievements</a:t>
             </a:r>
+            <a:endParaRPr b="1"/>
           </a:p>
           <a:p>
             <a:pPr marL="0" indent="0">
@@ -3970,8 +4061,13 @@
               </a:defRPr>
             </a:pPr>
             <a:r>
-              <a:t>Live Demo: https://your-link-here.com</a:t>
-            </a:r>
+              <a:t>Live Demo: </a:t>
+            </a:r>
+            <a:r>
+              <a:rPr lang="en-US" altLang="zh-CN"/>
+              <a:t>morphex-mo.github.io/COMP4422-Computer-Graphics-Proj/?scene=starCollectorScene</a:t>
+            </a:r>
+            <a:endParaRPr lang="en-US" altLang="zh-CN"/>
           </a:p>
           <a:p>
             <a:pPr>
@@ -4032,7 +4128,12 @@
             <p:ph type="title"/>
           </p:nvPr>
         </p:nvSpPr>
-        <p:spPr/>
+        <p:spPr>
+          <a:xfrm>
+            <a:off x="1718310" y="274638"/>
+            <a:ext cx="8229600" cy="1143000"/>
+          </a:xfrm>
+        </p:spPr>
         <p:txBody>
           <a:bodyPr/>
           <a:lstStyle/>
@@ -4061,7 +4162,12 @@
             <p:ph idx="1"/>
           </p:nvPr>
         </p:nvSpPr>
-        <p:spPr/>
+        <p:spPr>
+          <a:xfrm>
+            <a:off x="2516505" y="1600200"/>
+            <a:ext cx="8229600" cy="4525963"/>
+          </a:xfrm>
+        </p:spPr>
         <p:txBody>
           <a:bodyPr/>
           <a:lstStyle/>
@@ -4097,10 +4203,11 @@
             </a:r>
           </a:p>
           <a:p>
-            <a:pPr>
-              <a:spcAft>
-                <a:spcPts val="600"/>
-              </a:spcAft>
+            <a:pPr marL="0" indent="0">
+              <a:spcAft>
+                <a:spcPts val="600"/>
+              </a:spcAft>
+              <a:buNone/>
               <a:defRPr sz="2000">
                 <a:solidFill>
                   <a:srgbClr val="64DCFF"/>
@@ -4111,60 +4218,11 @@
             <a:r>
               <a:t>───────────────────────────────────────</a:t>
             </a:r>
-          </a:p>
-          <a:p>
-            <a:pPr>
-              <a:spcAft>
-                <a:spcPts val="600"/>
-              </a:spcAft>
-              <a:defRPr sz="2000">
-                <a:solidFill>
-                  <a:srgbClr val="64DCFF"/>
-                </a:solidFill>
-                <a:latin typeface="Calibri" panose="020F0502020204030204"/>
-              </a:defRPr>
-            </a:pPr>
-            <a:r>
-              <a:t>Alice Wang      12345678   Fox rigging, Toon shader, Animation</a:t>
-            </a:r>
-          </a:p>
-          <a:p>
-            <a:pPr>
-              <a:spcAft>
-                <a:spcPts val="600"/>
-              </a:spcAft>
-              <a:defRPr sz="2000">
-                <a:solidFill>
-                  <a:srgbClr val="64DCFF"/>
-                </a:solidFill>
-                <a:latin typeface="Calibri" panose="020F0502020204030204"/>
-              </a:defRPr>
-            </a:pPr>
-            <a:r>
-              <a:t>Bob Li         </a:t>
-            </a:r>
-            <a:r>
-              <a:rPr lang="en-US"/>
-              <a:t>     </a:t>
-            </a:r>
-            <a:r>
-              <a:t> 12345679   Terrain generation, Tree scattering</a:t>
-            </a:r>
-          </a:p>
-          <a:p>
-            <a:pPr>
-              <a:spcAft>
-                <a:spcPts val="600"/>
-              </a:spcAft>
-              <a:defRPr sz="2000">
-                <a:solidFill>
-                  <a:srgbClr val="64DCFF"/>
-                </a:solidFill>
-                <a:latin typeface="Calibri" panose="020F0502020204030204"/>
-              </a:defRPr>
-            </a:pPr>
-            <a:r>
-              <a:t>Cathy Zhang    12345680   Star &amp; particle system, Timeline</a:t>
+            <a:r>
+              <a:rPr>
+                <a:sym typeface="+mn-ea"/>
+              </a:rPr>
+              <a:t>────────────</a:t>
             </a:r>
           </a:p>
           <a:p>
@@ -4342,7 +4400,12 @@
             <p:ph idx="1"/>
           </p:nvPr>
         </p:nvSpPr>
-        <p:spPr/>
+        <p:spPr>
+          <a:xfrm>
+            <a:off x="1028700" y="1600200"/>
+            <a:ext cx="8229600" cy="4525963"/>
+          </a:xfrm>
+        </p:spPr>
         <p:txBody>
           <a:bodyPr>
             <a:normAutofit fontScale="80000"/>
@@ -4629,7 +4692,12 @@
             <p:ph idx="1"/>
           </p:nvPr>
         </p:nvSpPr>
-        <p:spPr/>
+        <p:spPr>
+          <a:xfrm>
+            <a:off x="2124710" y="1417955"/>
+            <a:ext cx="8229600" cy="4525963"/>
+          </a:xfrm>
+        </p:spPr>
         <p:txBody>
           <a:bodyPr/>
           <a:lstStyle/>
@@ -4748,6 +4816,30 @@
           </a:p>
         </p:txBody>
       </p:sp>
+      <p:pic>
+        <p:nvPicPr>
+          <p:cNvPr id="4" name="图片 3"/>
+          <p:cNvPicPr>
+            <a:picLocks noChangeAspect="1"/>
+          </p:cNvPicPr>
+          <p:nvPr/>
+        </p:nvPicPr>
+        <p:blipFill>
+          <a:blip r:embed="rId1"/>
+          <a:stretch>
+            <a:fillRect/>
+          </a:stretch>
+        </p:blipFill>
+        <p:spPr>
+          <a:xfrm>
+            <a:off x="962660" y="4709795"/>
+            <a:ext cx="9391650" cy="1628775"/>
+          </a:xfrm>
+          <a:prstGeom prst="rect">
+            <a:avLst/>
+          </a:prstGeom>
+        </p:spPr>
+      </p:pic>
     </p:spTree>
   </p:cSld>
   <p:clrMapOvr>
@@ -4813,7 +4905,12 @@
             <p:ph idx="1"/>
           </p:nvPr>
         </p:nvSpPr>
-        <p:spPr/>
+        <p:spPr>
+          <a:xfrm>
+            <a:off x="1028700" y="1600200"/>
+            <a:ext cx="8229600" cy="4525963"/>
+          </a:xfrm>
+        </p:spPr>
         <p:txBody>
           <a:bodyPr/>
           <a:lstStyle/>
@@ -4993,6 +5090,30 @@
           </a:p>
         </p:txBody>
       </p:sp>
+      <p:pic>
+        <p:nvPicPr>
+          <p:cNvPr id="4" name="图片 3"/>
+          <p:cNvPicPr>
+            <a:picLocks noChangeAspect="1"/>
+          </p:cNvPicPr>
+          <p:nvPr/>
+        </p:nvPicPr>
+        <p:blipFill>
+          <a:blip r:embed="rId1"/>
+          <a:stretch>
+            <a:fillRect/>
+          </a:stretch>
+        </p:blipFill>
+        <p:spPr>
+          <a:xfrm>
+            <a:off x="5450205" y="2733675"/>
+            <a:ext cx="6220460" cy="3411220"/>
+          </a:xfrm>
+          <a:prstGeom prst="rect">
+            <a:avLst/>
+          </a:prstGeom>
+        </p:spPr>
+      </p:pic>
     </p:spTree>
   </p:cSld>
   <p:clrMapOvr>
@@ -5060,7 +5181,7 @@
         </p:nvSpPr>
         <p:spPr>
           <a:xfrm>
-            <a:off x="457200" y="1165860"/>
+            <a:off x="665480" y="1165860"/>
             <a:ext cx="8229600" cy="4787265"/>
           </a:xfrm>
         </p:spPr>
@@ -5273,6 +5394,30 @@
           </a:p>
         </p:txBody>
       </p:sp>
+      <p:pic>
+        <p:nvPicPr>
+          <p:cNvPr id="4" name="图片 3"/>
+          <p:cNvPicPr>
+            <a:picLocks noChangeAspect="1"/>
+          </p:cNvPicPr>
+          <p:nvPr/>
+        </p:nvPicPr>
+        <p:blipFill>
+          <a:blip r:embed="rId1"/>
+          <a:stretch>
+            <a:fillRect/>
+          </a:stretch>
+        </p:blipFill>
+        <p:spPr>
+          <a:xfrm>
+            <a:off x="4460240" y="1623695"/>
+            <a:ext cx="6216015" cy="4536440"/>
+          </a:xfrm>
+          <a:prstGeom prst="rect">
+            <a:avLst/>
+          </a:prstGeom>
+        </p:spPr>
+      </p:pic>
     </p:spTree>
   </p:cSld>
   <p:clrMapOvr>
@@ -5338,12 +5483,85 @@
             <p:ph idx="1"/>
           </p:nvPr>
         </p:nvSpPr>
-        <p:spPr/>
+        <p:spPr>
+          <a:xfrm>
+            <a:off x="2117090" y="1600200"/>
+            <a:ext cx="8229600" cy="4525963"/>
+          </a:xfrm>
+        </p:spPr>
         <p:txBody>
           <a:bodyPr/>
           <a:lstStyle/>
           <a:p/>
           <a:p>
+            <a:pPr marL="0" indent="0">
+              <a:spcAft>
+                <a:spcPts val="600"/>
+              </a:spcAft>
+              <a:buNone/>
+              <a:defRPr sz="2200">
+                <a:solidFill>
+                  <a:srgbClr val="FFFFFF"/>
+                </a:solidFill>
+                <a:latin typeface="Calibri" panose="020F0502020204030204"/>
+              </a:defRPr>
+            </a:pPr>
+            <a:r>
+              <a:t>• Dynamic directional light (sun → moon)</a:t>
+            </a:r>
+          </a:p>
+          <a:p>
+            <a:pPr marL="0" indent="0">
+              <a:spcAft>
+                <a:spcPts val="600"/>
+              </a:spcAft>
+              <a:buNone/>
+              <a:defRPr sz="2200">
+                <a:solidFill>
+                  <a:srgbClr val="FFFFFF"/>
+                </a:solidFill>
+                <a:latin typeface="Calibri" panose="020F0502020204030204"/>
+              </a:defRPr>
+            </a:pPr>
+            <a:r>
+              <a:t>• Real-time day-night cycle (frozen at deep night)</a:t>
+            </a:r>
+          </a:p>
+          <a:p>
+            <a:pPr marL="0" indent="0">
+              <a:spcAft>
+                <a:spcPts val="600"/>
+              </a:spcAft>
+              <a:buNone/>
+              <a:defRPr sz="2200">
+                <a:solidFill>
+                  <a:srgbClr val="FFFFFF"/>
+                </a:solidFill>
+                <a:latin typeface="Calibri" panose="020F0502020204030204"/>
+              </a:defRPr>
+            </a:pPr>
+            <a:r>
+              <a:t>• Star self-illumination with additive glow</a:t>
+            </a:r>
+          </a:p>
+          <a:p>
+            <a:pPr marL="0" indent="0">
+              <a:spcAft>
+                <a:spcPts val="600"/>
+              </a:spcAft>
+              <a:buNone/>
+              <a:defRPr sz="2200">
+                <a:solidFill>
+                  <a:srgbClr val="FFFFFF"/>
+                </a:solidFill>
+                <a:latin typeface="Calibri" panose="020F0502020204030204"/>
+              </a:defRPr>
+            </a:pPr>
+            <a:r>
+              <a:t>• Shadow casting on fox and trees</a:t>
+            </a:r>
+          </a:p>
+          <a:p>
             <a:pPr>
               <a:spcAft>
                 <a:spcPts val="600"/>
@@ -5355,89 +5573,47 @@
                 <a:latin typeface="Calibri" panose="020F0502020204030204"/>
               </a:defRPr>
             </a:pPr>
-            <a:r>
-              <a:t>• Dynamic directional light (sun → moon)</a:t>
-            </a:r>
-          </a:p>
-          <a:p>
-            <a:pPr>
-              <a:spcAft>
-                <a:spcPts val="600"/>
-              </a:spcAft>
-              <a:defRPr sz="2200">
-                <a:solidFill>
-                  <a:srgbClr val="FFFFFF"/>
-                </a:solidFill>
-                <a:latin typeface="Calibri" panose="020F0502020204030204"/>
-              </a:defRPr>
-            </a:pPr>
-            <a:r>
-              <a:t>• Real-time day-night cycle (frozen at deep night)</a:t>
-            </a:r>
-          </a:p>
-          <a:p>
-            <a:pPr>
-              <a:spcAft>
-                <a:spcPts val="600"/>
-              </a:spcAft>
-              <a:defRPr sz="2200">
-                <a:solidFill>
-                  <a:srgbClr val="FFFFFF"/>
-                </a:solidFill>
-                <a:latin typeface="Calibri" panose="020F0502020204030204"/>
-              </a:defRPr>
-            </a:pPr>
-            <a:r>
-              <a:t>• Star self-illumination with additive glow</a:t>
-            </a:r>
-          </a:p>
-          <a:p>
-            <a:pPr>
-              <a:spcAft>
-                <a:spcPts val="600"/>
-              </a:spcAft>
-              <a:defRPr sz="2200">
-                <a:solidFill>
-                  <a:srgbClr val="FFFFFF"/>
-                </a:solidFill>
-                <a:latin typeface="Calibri" panose="020F0502020204030204"/>
-              </a:defRPr>
-            </a:pPr>
-            <a:r>
-              <a:t>• Shadow casting on fox and trees</a:t>
-            </a:r>
-          </a:p>
-          <a:p>
-            <a:pPr>
-              <a:spcAft>
-                <a:spcPts val="600"/>
-              </a:spcAft>
-              <a:defRPr sz="2200">
-                <a:solidFill>
-                  <a:srgbClr val="FFFFFF"/>
-                </a:solidFill>
-                <a:latin typeface="Calibri" panose="020F0502020204030204"/>
-              </a:defRPr>
-            </a:pPr>
-          </a:p>
-          <a:p>
-            <a:pPr>
-              <a:spcAft>
-                <a:spcPts val="600"/>
-              </a:spcAft>
-              <a:defRPr sz="2200">
-                <a:solidFill>
-                  <a:srgbClr val="FFFFFF"/>
-                </a:solidFill>
-                <a:latin typeface="Calibri" panose="020F0502020204030204"/>
-              </a:defRPr>
-            </a:pPr>
-            <a:r>
-              <a:t>Insert day vs night comparison</a:t>
-            </a:r>
-          </a:p>
-        </p:txBody>
-      </p:sp>
+          </a:p>
+          <a:p>
+            <a:pPr marL="0" indent="0">
+              <a:spcAft>
+                <a:spcPts val="600"/>
+              </a:spcAft>
+              <a:buNone/>
+              <a:defRPr sz="2200">
+                <a:solidFill>
+                  <a:srgbClr val="FFFFFF"/>
+                </a:solidFill>
+                <a:latin typeface="Calibri" panose="020F0502020204030204"/>
+              </a:defRPr>
+            </a:pPr>
+          </a:p>
+        </p:txBody>
+      </p:sp>
+      <p:pic>
+        <p:nvPicPr>
+          <p:cNvPr id="4" name="图片 3"/>
+          <p:cNvPicPr>
+            <a:picLocks noChangeAspect="1"/>
+          </p:cNvPicPr>
+          <p:nvPr/>
+        </p:nvPicPr>
+        <p:blipFill>
+          <a:blip r:embed="rId1"/>
+          <a:stretch>
+            <a:fillRect/>
+          </a:stretch>
+        </p:blipFill>
+        <p:spPr>
+          <a:xfrm>
+            <a:off x="2117090" y="4215765"/>
+            <a:ext cx="6287135" cy="2028825"/>
+          </a:xfrm>
+          <a:prstGeom prst="rect">
+            <a:avLst/>
+          </a:prstGeom>
+        </p:spPr>
+      </p:pic>
     </p:spTree>
   </p:cSld>
   <p:clrMapOvr>
@@ -5503,7 +5679,12 @@
             <p:ph idx="1"/>
           </p:nvPr>
         </p:nvSpPr>
-        <p:spPr/>
+        <p:spPr>
+          <a:xfrm>
+            <a:off x="1245870" y="1600200"/>
+            <a:ext cx="8229600" cy="4525963"/>
+          </a:xfrm>
+        </p:spPr>
         <p:txBody>
           <a:bodyPr/>
           <a:lstStyle/>
@@ -5611,36 +5792,45 @@
             </a:r>
           </a:p>
           <a:p>
-            <a:pPr>
-              <a:spcAft>
-                <a:spcPts val="600"/>
-              </a:spcAft>
-              <a:defRPr sz="2200">
-                <a:solidFill>
-                  <a:srgbClr val="FFFFFF"/>
-                </a:solidFill>
-                <a:latin typeface="Calibri" panose="020F0502020204030204"/>
-              </a:defRPr>
-            </a:pPr>
-          </a:p>
-          <a:p>
-            <a:pPr>
-              <a:spcAft>
-                <a:spcPts val="600"/>
-              </a:spcAft>
-              <a:defRPr sz="2200">
-                <a:solidFill>
-                  <a:srgbClr val="FFFFFF"/>
-                </a:solidFill>
-                <a:latin typeface="Calibri" panose="020F0502020204030204"/>
-              </a:defRPr>
-            </a:pPr>
-            <a:r>
-              <a:t>Insert 4-side comparison (standard → final toon)</a:t>
-            </a:r>
-          </a:p>
-        </p:txBody>
-      </p:sp>
+            <a:pPr marL="0" indent="0">
+              <a:spcAft>
+                <a:spcPts val="600"/>
+              </a:spcAft>
+              <a:buNone/>
+              <a:defRPr sz="2200">
+                <a:solidFill>
+                  <a:srgbClr val="FFFFFF"/>
+                </a:solidFill>
+                <a:latin typeface="Calibri" panose="020F0502020204030204"/>
+              </a:defRPr>
+            </a:pPr>
+          </a:p>
+        </p:txBody>
+      </p:sp>
+      <p:pic>
+        <p:nvPicPr>
+          <p:cNvPr id="4" name="图片 3"/>
+          <p:cNvPicPr>
+            <a:picLocks noChangeAspect="1"/>
+          </p:cNvPicPr>
+          <p:nvPr/>
+        </p:nvPicPr>
+        <p:blipFill>
+          <a:blip r:embed="rId1"/>
+          <a:stretch>
+            <a:fillRect/>
+          </a:stretch>
+        </p:blipFill>
+        <p:spPr>
+          <a:xfrm>
+            <a:off x="5550535" y="2095500"/>
+            <a:ext cx="5960745" cy="3491865"/>
+          </a:xfrm>
+          <a:prstGeom prst="rect">
+            <a:avLst/>
+          </a:prstGeom>
+        </p:spPr>
+      </p:pic>
     </p:spTree>
   </p:cSld>
   <p:clrMapOvr>
@@ -5706,7 +5896,12 @@
             <p:ph idx="1"/>
           </p:nvPr>
         </p:nvSpPr>
-        <p:spPr/>
+        <p:spPr>
+          <a:xfrm>
+            <a:off x="1165225" y="1600200"/>
+            <a:ext cx="8229600" cy="4525963"/>
+          </a:xfrm>
+        </p:spPr>
         <p:txBody>
           <a:bodyPr/>
           <a:lstStyle/>
@@ -5776,23 +5971,45 @@
             </a:pPr>
           </a:p>
           <a:p>
-            <a:pPr>
-              <a:spcAft>
-                <a:spcPts val="600"/>
-              </a:spcAft>
-              <a:defRPr sz="2200">
-                <a:solidFill>
-                  <a:srgbClr val="FFFFFF"/>
-                </a:solidFill>
-                <a:latin typeface="Calibri" panose="020F0502020204030204"/>
-              </a:defRPr>
-            </a:pPr>
-            <a:r>
-              <a:t>Insert atmosphere ON/OFF comparison</a:t>
-            </a:r>
-          </a:p>
-        </p:txBody>
-      </p:sp>
+            <a:pPr marL="0" indent="0">
+              <a:spcAft>
+                <a:spcPts val="600"/>
+              </a:spcAft>
+              <a:buNone/>
+              <a:defRPr sz="2200">
+                <a:solidFill>
+                  <a:srgbClr val="FFFFFF"/>
+                </a:solidFill>
+                <a:latin typeface="Calibri" panose="020F0502020204030204"/>
+              </a:defRPr>
+            </a:pPr>
+          </a:p>
+        </p:txBody>
+      </p:sp>
+      <p:pic>
+        <p:nvPicPr>
+          <p:cNvPr id="4" name="图片 3"/>
+          <p:cNvPicPr>
+            <a:picLocks noChangeAspect="1"/>
+          </p:cNvPicPr>
+          <p:nvPr/>
+        </p:nvPicPr>
+        <p:blipFill>
+          <a:blip r:embed="rId1"/>
+          <a:stretch>
+            <a:fillRect/>
+          </a:stretch>
+        </p:blipFill>
+        <p:spPr>
+          <a:xfrm>
+            <a:off x="1165225" y="4135755"/>
+            <a:ext cx="9324975" cy="1990725"/>
+          </a:xfrm>
+          <a:prstGeom prst="rect">
+            <a:avLst/>
+          </a:prstGeom>
+        </p:spPr>
+      </p:pic>
     </p:spTree>
   </p:cSld>
   <p:clrMapOvr>
@@ -5858,7 +6075,12 @@
             <p:ph idx="1"/>
           </p:nvPr>
         </p:nvSpPr>
-        <p:spPr/>
+        <p:spPr>
+          <a:xfrm>
+            <a:off x="1201420" y="1600200"/>
+            <a:ext cx="8229600" cy="4525963"/>
+          </a:xfrm>
+        </p:spPr>
         <p:txBody>
           <a:bodyPr/>
           <a:lstStyle/>
@@ -5945,23 +6167,45 @@
             </a:pPr>
           </a:p>
           <a:p>
-            <a:pPr>
-              <a:spcAft>
-                <a:spcPts val="600"/>
-              </a:spcAft>
-              <a:defRPr sz="2200">
-                <a:solidFill>
-                  <a:srgbClr val="FFFFFF"/>
-                </a:solidFill>
-                <a:latin typeface="Calibri" panose="020F0502020204030204"/>
-              </a:defRPr>
-            </a:pPr>
-            <a:r>
-              <a:t>Insert animation sequence</a:t>
-            </a:r>
-          </a:p>
-        </p:txBody>
-      </p:sp>
+            <a:pPr marL="0" indent="0">
+              <a:spcAft>
+                <a:spcPts val="600"/>
+              </a:spcAft>
+              <a:buNone/>
+              <a:defRPr sz="2200">
+                <a:solidFill>
+                  <a:srgbClr val="FFFFFF"/>
+                </a:solidFill>
+                <a:latin typeface="Calibri" panose="020F0502020204030204"/>
+              </a:defRPr>
+            </a:pPr>
+          </a:p>
+        </p:txBody>
+      </p:sp>
+      <p:pic>
+        <p:nvPicPr>
+          <p:cNvPr id="4" name="图片 3"/>
+          <p:cNvPicPr>
+            <a:picLocks noChangeAspect="1"/>
+          </p:cNvPicPr>
+          <p:nvPr/>
+        </p:nvPicPr>
+        <p:blipFill>
+          <a:blip r:embed="rId1"/>
+          <a:stretch>
+            <a:fillRect/>
+          </a:stretch>
+        </p:blipFill>
+        <p:spPr>
+          <a:xfrm>
+            <a:off x="5520690" y="2952750"/>
+            <a:ext cx="5452110" cy="2376170"/>
+          </a:xfrm>
+          <a:prstGeom prst="rect">
+            <a:avLst/>
+          </a:prstGeom>
+        </p:spPr>
+      </p:pic>
     </p:spTree>
   </p:cSld>
   <p:clrMapOvr>

</xml_diff>

<commit_message>
Add offline HTML and media files for Star Collector
Added Star_Collector_Offline.html and several MP4 video files (part1.mp4, part2.mp4, part3.mp4, presentation_vedio.mp4) to support offline access and presentation of the Star Collector project. Also updated the Star_Collector_Presentation_Perfect_16pages.pptx file.
</commit_message>
<xml_diff>
--- a/Star_Collector_Presentation_Perfect_16pages.pptx
+++ b/Star_Collector_Presentation_Perfect_16pages.pptx
@@ -3692,7 +3692,7 @@
       </p:sp>
       <p:pic>
         <p:nvPicPr>
-          <p:cNvPr id="4" name="图片 3"/>
+          <p:cNvPr id="5" name="图片 4"/>
           <p:cNvPicPr>
             <a:picLocks noChangeAspect="1"/>
           </p:cNvPicPr>
@@ -3706,8 +3706,8 @@
         </p:blipFill>
         <p:spPr>
           <a:xfrm>
-            <a:off x="5702935" y="2414905"/>
-            <a:ext cx="5862320" cy="2689860"/>
+            <a:off x="6094095" y="1931035"/>
+            <a:ext cx="5088255" cy="4323715"/>
           </a:xfrm>
           <a:prstGeom prst="rect">
             <a:avLst/>
@@ -4682,7 +4682,7 @@
         </p:blipFill>
         <p:spPr>
           <a:xfrm>
-            <a:off x="7394575" y="3019425"/>
+            <a:off x="7394575" y="2556510"/>
             <a:ext cx="4522470" cy="3107055"/>
           </a:xfrm>
           <a:prstGeom prst="rect">
@@ -5123,60 +5123,21 @@
             </a:r>
           </a:p>
           <a:p>
-            <a:pPr>
-              <a:spcAft>
-                <a:spcPts val="600"/>
-              </a:spcAft>
-              <a:defRPr sz="2200">
-                <a:solidFill>
-                  <a:srgbClr val="FFFFFF"/>
-                </a:solidFill>
-                <a:latin typeface="Calibri" panose="020F0502020204030204"/>
-              </a:defRPr>
-            </a:pPr>
-          </a:p>
-          <a:p>
-            <a:pPr>
-              <a:spcAft>
-                <a:spcPts val="600"/>
-              </a:spcAft>
-              <a:defRPr sz="2200">
-                <a:solidFill>
-                  <a:srgbClr val="FFFFFF"/>
-                </a:solidFill>
-                <a:latin typeface="Calibri" panose="020F0502020204030204"/>
-              </a:defRPr>
-            </a:pPr>
-            <a:r>
-              <a:t>Insert model screenshots here</a:t>
-            </a:r>
-          </a:p>
-        </p:txBody>
-      </p:sp>
-      <p:pic>
-        <p:nvPicPr>
-          <p:cNvPr id="4" name="图片 3"/>
-          <p:cNvPicPr>
-            <a:picLocks noChangeAspect="1"/>
-          </p:cNvPicPr>
-          <p:nvPr/>
-        </p:nvPicPr>
-        <p:blipFill>
-          <a:blip r:embed="rId1"/>
-          <a:stretch>
-            <a:fillRect/>
-          </a:stretch>
-        </p:blipFill>
-        <p:spPr>
-          <a:xfrm>
-            <a:off x="5450205" y="2733675"/>
-            <a:ext cx="6220460" cy="3411220"/>
-          </a:xfrm>
-          <a:prstGeom prst="rect">
-            <a:avLst/>
-          </a:prstGeom>
-        </p:spPr>
-      </p:pic>
+            <a:pPr marL="0" indent="0">
+              <a:spcAft>
+                <a:spcPts val="600"/>
+              </a:spcAft>
+              <a:buNone/>
+              <a:defRPr sz="2200">
+                <a:solidFill>
+                  <a:srgbClr val="FFFFFF"/>
+                </a:solidFill>
+                <a:latin typeface="Calibri" panose="020F0502020204030204"/>
+              </a:defRPr>
+            </a:pPr>
+          </a:p>
+        </p:txBody>
+      </p:sp>
     </p:spTree>
   </p:cSld>
   <p:clrMapOvr>
@@ -5961,7 +5922,7 @@
         </p:nvSpPr>
         <p:spPr>
           <a:xfrm>
-            <a:off x="1165225" y="1600200"/>
+            <a:off x="457200" y="1600200"/>
             <a:ext cx="8229600" cy="4525963"/>
           </a:xfrm>
         </p:spPr>
@@ -6051,7 +6012,7 @@
       </p:sp>
       <p:pic>
         <p:nvPicPr>
-          <p:cNvPr id="4" name="图片 3"/>
+          <p:cNvPr id="5" name="图片 4"/>
           <p:cNvPicPr>
             <a:picLocks noChangeAspect="1"/>
           </p:cNvPicPr>
@@ -6065,8 +6026,8 @@
         </p:blipFill>
         <p:spPr>
           <a:xfrm>
-            <a:off x="1165225" y="4135755"/>
-            <a:ext cx="9324975" cy="1990725"/>
+            <a:off x="5732780" y="1955165"/>
+            <a:ext cx="6057900" cy="3989070"/>
           </a:xfrm>
           <a:prstGeom prst="rect">
             <a:avLst/>

</xml_diff>